<commit_message>
Improving example code on slide 14
</commit_message>
<xml_diff>
--- a/murach_js_3e/slides/Chapter 04 slides.pptx
+++ b/murach_js_3e/slides/Chapter 04 slides.pptx
@@ -2755,7 +2755,7 @@
           <a:graphicData uri="http://schemas.openxmlformats.org/presentationml/2006/ole">
             <mc:AlternateContent xmlns:mc="http://schemas.openxmlformats.org/markup-compatibility/2006">
               <mc:Choice xmlns:v="urn:schemas-microsoft-com:vml" Requires="v">
-                <p:oleObj spid="_x0000_s1058" name="Document" r:id="rId3" imgW="7301323" imgH="3008711" progId="Word.Document.12">
+                <p:oleObj spid="_x0000_s1060" name="Document" r:id="rId3" imgW="7301323" imgH="3008711" progId="Word.Document.12">
                   <p:embed/>
                 </p:oleObj>
               </mc:Choice>
@@ -3073,7 +3073,7 @@
           <a:graphicData uri="http://schemas.openxmlformats.org/presentationml/2006/ole">
             <mc:AlternateContent xmlns:mc="http://schemas.openxmlformats.org/markup-compatibility/2006">
               <mc:Choice xmlns:v="urn:schemas-microsoft-com:vml" Requires="v">
-                <p:oleObj spid="_x0000_s44078" name="Document" r:id="rId3" imgW="7313400" imgH="2653763" progId="Word.Document.12">
+                <p:oleObj spid="_x0000_s44080" name="Document" r:id="rId3" imgW="7313400" imgH="2653763" progId="Word.Document.12">
                   <p:embed/>
                 </p:oleObj>
               </mc:Choice>
@@ -3182,7 +3182,7 @@
           <a:graphicData uri="http://schemas.openxmlformats.org/presentationml/2006/ole">
             <mc:AlternateContent xmlns:mc="http://schemas.openxmlformats.org/markup-compatibility/2006">
               <mc:Choice xmlns:v="urn:schemas-microsoft-com:vml" Requires="v">
-                <p:oleObj spid="_x0000_s115734" name="Document" r:id="rId3" imgW="7301323" imgH="2580232" progId="Word.Document.12">
+                <p:oleObj spid="_x0000_s115736" name="Document" r:id="rId3" imgW="7301323" imgH="2580232" progId="Word.Document.12">
                   <p:embed/>
                 </p:oleObj>
               </mc:Choice>
@@ -3501,7 +3501,7 @@
           <a:graphicData uri="http://schemas.openxmlformats.org/presentationml/2006/ole">
             <mc:AlternateContent xmlns:mc="http://schemas.openxmlformats.org/markup-compatibility/2006">
               <mc:Choice xmlns:v="urn:schemas-microsoft-com:vml" Requires="v">
-                <p:oleObj spid="_x0000_s116758" name="Document" r:id="rId3" imgW="7313400" imgH="1884906" progId="Word.Document.12">
+                <p:oleObj spid="_x0000_s116760" name="Document" r:id="rId3" imgW="7313400" imgH="1884906" progId="Word.Document.12">
                   <p:embed/>
                 </p:oleObj>
               </mc:Choice>
@@ -3735,7 +3735,7 @@
           <a:graphicData uri="http://schemas.openxmlformats.org/presentationml/2006/ole">
             <mc:AlternateContent xmlns:mc="http://schemas.openxmlformats.org/markup-compatibility/2006">
               <mc:Choice xmlns:v="urn:schemas-microsoft-com:vml" Requires="v">
-                <p:oleObj spid="_x0000_s117782" name="Document" r:id="rId3" imgW="7313400" imgH="2344709" progId="Word.Document.12">
+                <p:oleObj spid="_x0000_s117784" name="Document" r:id="rId3" imgW="7313400" imgH="2344709" progId="Word.Document.12">
                   <p:embed/>
                 </p:oleObj>
               </mc:Choice>
@@ -3936,25 +3936,25 @@
           <p:nvPr>
             <p:extLst>
               <p:ext uri="{D42A27DB-BD31-4B8C-83A1-F6EECF244321}">
-                <p14:modId xmlns:p14="http://schemas.microsoft.com/office/powerpoint/2010/main" val="3287246917"/>
+                <p14:modId xmlns:p14="http://schemas.microsoft.com/office/powerpoint/2010/main" val="514205119"/>
               </p:ext>
             </p:extLst>
           </p:nvPr>
         </p:nvGraphicFramePr>
         <p:xfrm>
-          <a:off x="914400" y="1130300"/>
-          <a:ext cx="7253288" cy="2054225"/>
+          <a:off x="914400" y="1128713"/>
+          <a:ext cx="7170738" cy="2036762"/>
         </p:xfrm>
         <a:graphic>
           <a:graphicData uri="http://schemas.openxmlformats.org/presentationml/2006/ole">
             <mc:AlternateContent xmlns:mc="http://schemas.openxmlformats.org/markup-compatibility/2006">
               <mc:Choice xmlns:v="urn:schemas-microsoft-com:vml" Requires="v">
-                <p:oleObj spid="_x0000_s118806" name="Document" r:id="rId3" imgW="7301323" imgH="2074770" progId="Word.Document.12">
+                <p:oleObj spid="_x0000_s118808" name="Document" r:id="rId3" imgW="7301323" imgH="2078015" progId="Word.Document.12">
                   <p:embed/>
                 </p:oleObj>
               </mc:Choice>
               <mc:Fallback>
-                <p:oleObj name="Document" r:id="rId3" imgW="7301323" imgH="2074770" progId="Word.Document.12">
+                <p:oleObj name="Document" r:id="rId3" imgW="7301323" imgH="2078015" progId="Word.Document.12">
                   <p:embed/>
                   <p:pic>
                     <p:nvPicPr>
@@ -3970,8 +3970,8 @@
                     </p:blipFill>
                     <p:spPr>
                       <a:xfrm>
-                        <a:off x="914400" y="1130300"/>
-                        <a:ext cx="7253288" cy="2054225"/>
+                        <a:off x="914400" y="1128713"/>
+                        <a:ext cx="7170738" cy="2036762"/>
                       </a:xfrm>
                       <a:prstGeom prst="rect">
                         <a:avLst/>
@@ -4163,7 +4163,7 @@
           <a:graphicData uri="http://schemas.openxmlformats.org/presentationml/2006/ole">
             <mc:AlternateContent xmlns:mc="http://schemas.openxmlformats.org/markup-compatibility/2006">
               <mc:Choice xmlns:v="urn:schemas-microsoft-com:vml" Requires="v">
-                <p:oleObj spid="_x0000_s49197" name="Document" r:id="rId3" imgW="7313400" imgH="1424743" progId="Word.Document.12">
+                <p:oleObj spid="_x0000_s49199" name="Document" r:id="rId3" imgW="7313400" imgH="1424743" progId="Word.Document.12">
                   <p:embed/>
                 </p:oleObj>
               </mc:Choice>
@@ -4377,7 +4377,7 @@
           <a:graphicData uri="http://schemas.openxmlformats.org/presentationml/2006/ole">
             <mc:AlternateContent xmlns:mc="http://schemas.openxmlformats.org/markup-compatibility/2006">
               <mc:Choice xmlns:v="urn:schemas-microsoft-com:vml" Requires="v">
-                <p:oleObj spid="_x0000_s50257" name="Document" r:id="rId3" imgW="7313400" imgH="2915686" progId="Word.Document.12">
+                <p:oleObj spid="_x0000_s50259" name="Document" r:id="rId3" imgW="7313400" imgH="2915686" progId="Word.Document.12">
                   <p:embed/>
                 </p:oleObj>
               </mc:Choice>
@@ -4591,7 +4591,7 @@
           <a:graphicData uri="http://schemas.openxmlformats.org/presentationml/2006/ole">
             <mc:AlternateContent xmlns:mc="http://schemas.openxmlformats.org/markup-compatibility/2006">
               <mc:Choice xmlns:v="urn:schemas-microsoft-com:vml" Requires="v">
-                <p:oleObj spid="_x0000_s51278" name="Document" r:id="rId3" imgW="7313400" imgH="4416703" progId="Word.Document.12">
+                <p:oleObj spid="_x0000_s51280" name="Document" r:id="rId3" imgW="7313400" imgH="4416703" progId="Word.Document.12">
                   <p:embed/>
                 </p:oleObj>
               </mc:Choice>
@@ -4805,7 +4805,7 @@
           <a:graphicData uri="http://schemas.openxmlformats.org/presentationml/2006/ole">
             <mc:AlternateContent xmlns:mc="http://schemas.openxmlformats.org/markup-compatibility/2006">
               <mc:Choice xmlns:v="urn:schemas-microsoft-com:vml" Requires="v">
-                <p:oleObj spid="_x0000_s120854" name="Document" r:id="rId3" imgW="7313400" imgH="3862636" progId="Word.Document.12">
+                <p:oleObj spid="_x0000_s120856" name="Document" r:id="rId3" imgW="7313400" imgH="3862636" progId="Word.Document.12">
                   <p:embed/>
                 </p:oleObj>
               </mc:Choice>
@@ -5019,7 +5019,7 @@
           <a:graphicData uri="http://schemas.openxmlformats.org/presentationml/2006/ole">
             <mc:AlternateContent xmlns:mc="http://schemas.openxmlformats.org/markup-compatibility/2006">
               <mc:Choice xmlns:v="urn:schemas-microsoft-com:vml" Requires="v">
-                <p:oleObj spid="_x0000_s74796" name="Document" r:id="rId3" imgW="7313400" imgH="690065" progId="Word.Document.12">
+                <p:oleObj spid="_x0000_s74798" name="Document" r:id="rId3" imgW="7313400" imgH="690065" progId="Word.Document.12">
                   <p:embed/>
                 </p:oleObj>
               </mc:Choice>
@@ -5128,7 +5128,7 @@
           <a:graphicData uri="http://schemas.openxmlformats.org/presentationml/2006/ole">
             <mc:AlternateContent xmlns:mc="http://schemas.openxmlformats.org/markup-compatibility/2006">
               <mc:Choice xmlns:v="urn:schemas-microsoft-com:vml" Requires="v">
-                <p:oleObj spid="_x0000_s2095" name="Document" r:id="rId3" imgW="7313400" imgH="5000271" progId="Word.Document.12">
+                <p:oleObj spid="_x0000_s2097" name="Document" r:id="rId3" imgW="7313400" imgH="5000271" progId="Word.Document.12">
                   <p:embed/>
                 </p:oleObj>
               </mc:Choice>
@@ -5454,7 +5454,7 @@
           <a:graphicData uri="http://schemas.openxmlformats.org/presentationml/2006/ole">
             <mc:AlternateContent xmlns:mc="http://schemas.openxmlformats.org/markup-compatibility/2006">
               <mc:Choice xmlns:v="urn:schemas-microsoft-com:vml" Requires="v">
-                <p:oleObj spid="_x0000_s76878" name="Document" r:id="rId3" imgW="7313400" imgH="1766897" progId="Word.Document.12">
+                <p:oleObj spid="_x0000_s76880" name="Document" r:id="rId3" imgW="7313400" imgH="1766897" progId="Word.Document.12">
                   <p:embed/>
                 </p:oleObj>
               </mc:Choice>
@@ -5675,7 +5675,7 @@
           <a:graphicData uri="http://schemas.openxmlformats.org/presentationml/2006/ole">
             <mc:AlternateContent xmlns:mc="http://schemas.openxmlformats.org/markup-compatibility/2006">
               <mc:Choice xmlns:v="urn:schemas-microsoft-com:vml" Requires="v">
-                <p:oleObj spid="_x0000_s75854" name="Document" r:id="rId3" imgW="7313400" imgH="1536995" progId="Word.Document.12">
+                <p:oleObj spid="_x0000_s75856" name="Document" r:id="rId3" imgW="7313400" imgH="1536995" progId="Word.Document.12">
                   <p:embed/>
                 </p:oleObj>
               </mc:Choice>
@@ -5901,7 +5901,7 @@
           <a:graphicData uri="http://schemas.openxmlformats.org/presentationml/2006/ole">
             <mc:AlternateContent xmlns:mc="http://schemas.openxmlformats.org/markup-compatibility/2006">
               <mc:Choice xmlns:v="urn:schemas-microsoft-com:vml" Requires="v">
-                <p:oleObj spid="_x0000_s121878" name="Document" r:id="rId3" imgW="7313400" imgH="2687223" progId="Word.Document.12">
+                <p:oleObj spid="_x0000_s121880" name="Document" r:id="rId3" imgW="7313400" imgH="2687223" progId="Word.Document.12">
                   <p:embed/>
                 </p:oleObj>
               </mc:Choice>
@@ -6115,7 +6115,7 @@
           <a:graphicData uri="http://schemas.openxmlformats.org/presentationml/2006/ole">
             <mc:AlternateContent xmlns:mc="http://schemas.openxmlformats.org/markup-compatibility/2006">
               <mc:Choice xmlns:v="urn:schemas-microsoft-com:vml" Requires="v">
-                <p:oleObj spid="_x0000_s77868" name="Document" r:id="rId3" imgW="7313400" imgH="690065" progId="Word.Document.12">
+                <p:oleObj spid="_x0000_s77870" name="Document" r:id="rId3" imgW="7313400" imgH="690065" progId="Word.Document.12">
                   <p:embed/>
                 </p:oleObj>
               </mc:Choice>
@@ -6341,7 +6341,7 @@
           <a:graphicData uri="http://schemas.openxmlformats.org/presentationml/2006/ole">
             <mc:AlternateContent xmlns:mc="http://schemas.openxmlformats.org/markup-compatibility/2006">
               <mc:Choice xmlns:v="urn:schemas-microsoft-com:vml" Requires="v">
-                <p:oleObj spid="_x0000_s129040" name="Document" r:id="rId3" imgW="7313400" imgH="1766897" progId="Word.Document.12">
+                <p:oleObj spid="_x0000_s129042" name="Document" r:id="rId3" imgW="7313400" imgH="1766897" progId="Word.Document.12">
                   <p:embed/>
                 </p:oleObj>
               </mc:Choice>
@@ -6567,7 +6567,7 @@
           <a:graphicData uri="http://schemas.openxmlformats.org/presentationml/2006/ole">
             <mc:AlternateContent xmlns:mc="http://schemas.openxmlformats.org/markup-compatibility/2006">
               <mc:Choice xmlns:v="urn:schemas-microsoft-com:vml" Requires="v">
-                <p:oleObj spid="_x0000_s130064" name="Document" r:id="rId3" imgW="7313400" imgH="1536995" progId="Word.Document.12">
+                <p:oleObj spid="_x0000_s130066" name="Document" r:id="rId3" imgW="7313400" imgH="1536995" progId="Word.Document.12">
                   <p:embed/>
                 </p:oleObj>
               </mc:Choice>
@@ -6793,7 +6793,7 @@
           <a:graphicData uri="http://schemas.openxmlformats.org/presentationml/2006/ole">
             <mc:AlternateContent xmlns:mc="http://schemas.openxmlformats.org/markup-compatibility/2006">
               <mc:Choice xmlns:v="urn:schemas-microsoft-com:vml" Requires="v">
-                <p:oleObj spid="_x0000_s122903" name="Document" r:id="rId3" imgW="7313400" imgH="2687223" progId="Word.Document.12">
+                <p:oleObj spid="_x0000_s122905" name="Document" r:id="rId3" imgW="7313400" imgH="2687223" progId="Word.Document.12">
                   <p:embed/>
                 </p:oleObj>
               </mc:Choice>
@@ -7007,7 +7007,7 @@
           <a:graphicData uri="http://schemas.openxmlformats.org/presentationml/2006/ole">
             <mc:AlternateContent xmlns:mc="http://schemas.openxmlformats.org/markup-compatibility/2006">
               <mc:Choice xmlns:v="urn:schemas-microsoft-com:vml" Requires="v">
-                <p:oleObj spid="_x0000_s79916" name="Document" r:id="rId3" imgW="7313400" imgH="3862636" progId="Word.Document.12">
+                <p:oleObj spid="_x0000_s79918" name="Document" r:id="rId3" imgW="7313400" imgH="3862636" progId="Word.Document.12">
                   <p:embed/>
                 </p:oleObj>
               </mc:Choice>
@@ -7221,7 +7221,7 @@
           <a:graphicData uri="http://schemas.openxmlformats.org/presentationml/2006/ole">
             <mc:AlternateContent xmlns:mc="http://schemas.openxmlformats.org/markup-compatibility/2006">
               <mc:Choice xmlns:v="urn:schemas-microsoft-com:vml" Requires="v">
-                <p:oleObj spid="_x0000_s80940" name="Document" r:id="rId3" imgW="7313400" imgH="2347228" progId="Word.Document.12">
+                <p:oleObj spid="_x0000_s80942" name="Document" r:id="rId3" imgW="7313400" imgH="2347228" progId="Word.Document.12">
                   <p:embed/>
                 </p:oleObj>
               </mc:Choice>
@@ -7435,7 +7435,7 @@
           <a:graphicData uri="http://schemas.openxmlformats.org/presentationml/2006/ole">
             <mc:AlternateContent xmlns:mc="http://schemas.openxmlformats.org/markup-compatibility/2006">
               <mc:Choice xmlns:v="urn:schemas-microsoft-com:vml" Requires="v">
-                <p:oleObj spid="_x0000_s81964" name="Document" r:id="rId3" imgW="7313400" imgH="2347228" progId="Word.Document.12">
+                <p:oleObj spid="_x0000_s81966" name="Document" r:id="rId3" imgW="7313400" imgH="2347228" progId="Word.Document.12">
                   <p:embed/>
                 </p:oleObj>
               </mc:Choice>
@@ -7544,7 +7544,7 @@
           <a:graphicData uri="http://schemas.openxmlformats.org/presentationml/2006/ole">
             <mc:AlternateContent xmlns:mc="http://schemas.openxmlformats.org/markup-compatibility/2006">
               <mc:Choice xmlns:v="urn:schemas-microsoft-com:vml" Requires="v">
-                <p:oleObj spid="_x0000_s3119" name="Document" r:id="rId3" imgW="7313400" imgH="4986600" progId="Word.Document.12">
+                <p:oleObj spid="_x0000_s3121" name="Document" r:id="rId3" imgW="7313400" imgH="4986600" progId="Word.Document.12">
                   <p:embed/>
                 </p:oleObj>
               </mc:Choice>
@@ -7875,7 +7875,7 @@
           <a:graphicData uri="http://schemas.openxmlformats.org/presentationml/2006/ole">
             <mc:AlternateContent xmlns:mc="http://schemas.openxmlformats.org/markup-compatibility/2006">
               <mc:Choice xmlns:v="urn:schemas-microsoft-com:vml" Requires="v">
-                <p:oleObj spid="_x0000_s83025" name="Document" r:id="rId3" imgW="7313400" imgH="2347228" progId="Word.Document.12">
+                <p:oleObj spid="_x0000_s83027" name="Document" r:id="rId3" imgW="7313400" imgH="2347228" progId="Word.Document.12">
                   <p:embed/>
                 </p:oleObj>
               </mc:Choice>
@@ -8094,7 +8094,7 @@
           <a:graphicData uri="http://schemas.openxmlformats.org/presentationml/2006/ole">
             <mc:AlternateContent xmlns:mc="http://schemas.openxmlformats.org/markup-compatibility/2006">
               <mc:Choice xmlns:v="urn:schemas-microsoft-com:vml" Requires="v">
-                <p:oleObj spid="_x0000_s131088" name="Document" r:id="rId3" imgW="7313400" imgH="3544587" progId="Word.Document.12">
+                <p:oleObj spid="_x0000_s131090" name="Document" r:id="rId3" imgW="7313400" imgH="3544587" progId="Word.Document.12">
                   <p:embed/>
                 </p:oleObj>
               </mc:Choice>
@@ -8313,7 +8313,7 @@
           <a:graphicData uri="http://schemas.openxmlformats.org/presentationml/2006/ole">
             <mc:AlternateContent xmlns:mc="http://schemas.openxmlformats.org/markup-compatibility/2006">
               <mc:Choice xmlns:v="urn:schemas-microsoft-com:vml" Requires="v">
-                <p:oleObj spid="_x0000_s132112" name="Document" r:id="rId3" imgW="7313400" imgH="2577489" progId="Word.Document.12">
+                <p:oleObj spid="_x0000_s132114" name="Document" r:id="rId3" imgW="7313400" imgH="2577489" progId="Word.Document.12">
                   <p:embed/>
                 </p:oleObj>
               </mc:Choice>
@@ -8422,7 +8422,7 @@
           <a:graphicData uri="http://schemas.openxmlformats.org/presentationml/2006/ole">
             <mc:AlternateContent xmlns:mc="http://schemas.openxmlformats.org/markup-compatibility/2006">
               <mc:Choice xmlns:v="urn:schemas-microsoft-com:vml" Requires="v">
-                <p:oleObj spid="_x0000_s84013" name="Document" r:id="rId3" imgW="7301323" imgH="1546483" progId="Word.Document.12">
+                <p:oleObj spid="_x0000_s84015" name="Document" r:id="rId3" imgW="7301323" imgH="1546483" progId="Word.Document.12">
                   <p:embed/>
                 </p:oleObj>
               </mc:Choice>
@@ -8636,7 +8636,7 @@
           <a:graphicData uri="http://schemas.openxmlformats.org/presentationml/2006/ole">
             <mc:AlternateContent xmlns:mc="http://schemas.openxmlformats.org/markup-compatibility/2006">
               <mc:Choice xmlns:v="urn:schemas-microsoft-com:vml" Requires="v">
-                <p:oleObj spid="_x0000_s85036" name="Document" r:id="rId3" imgW="7301323" imgH="2319545" progId="Word.Document.12">
+                <p:oleObj spid="_x0000_s85038" name="Document" r:id="rId3" imgW="7301323" imgH="2319545" progId="Word.Document.12">
                   <p:embed/>
                 </p:oleObj>
               </mc:Choice>
@@ -8955,7 +8955,7 @@
           <a:graphicData uri="http://schemas.openxmlformats.org/presentationml/2006/ole">
             <mc:AlternateContent xmlns:mc="http://schemas.openxmlformats.org/markup-compatibility/2006">
               <mc:Choice xmlns:v="urn:schemas-microsoft-com:vml" Requires="v">
-                <p:oleObj spid="_x0000_s86060" name="Document" r:id="rId3" imgW="7389702" imgH="3888540" progId="Word.Document.12">
+                <p:oleObj spid="_x0000_s86062" name="Document" r:id="rId3" imgW="7389702" imgH="3888540" progId="Word.Document.12">
                   <p:embed/>
                 </p:oleObj>
               </mc:Choice>
@@ -9169,7 +9169,7 @@
           <a:graphicData uri="http://schemas.openxmlformats.org/presentationml/2006/ole">
             <mc:AlternateContent xmlns:mc="http://schemas.openxmlformats.org/markup-compatibility/2006">
               <mc:Choice xmlns:v="urn:schemas-microsoft-com:vml" Requires="v">
-                <p:oleObj spid="_x0000_s87118" name="Document" r:id="rId3" imgW="7313400" imgH="1536995" progId="Word.Document.12">
+                <p:oleObj spid="_x0000_s87120" name="Document" r:id="rId3" imgW="7313400" imgH="1536995" progId="Word.Document.12">
                   <p:embed/>
                 </p:oleObj>
               </mc:Choice>
@@ -9390,7 +9390,7 @@
           <a:graphicData uri="http://schemas.openxmlformats.org/presentationml/2006/ole">
             <mc:AlternateContent xmlns:mc="http://schemas.openxmlformats.org/markup-compatibility/2006">
               <mc:Choice xmlns:v="urn:schemas-microsoft-com:vml" Requires="v">
-                <p:oleObj spid="_x0000_s88181" name="Document" r:id="rId3" imgW="7313400" imgH="3031896" progId="Word.Document.12">
+                <p:oleObj spid="_x0000_s88183" name="Document" r:id="rId3" imgW="7313400" imgH="3031896" progId="Word.Document.12">
                   <p:embed/>
                 </p:oleObj>
               </mc:Choice>
@@ -9604,7 +9604,7 @@
           <a:graphicData uri="http://schemas.openxmlformats.org/presentationml/2006/ole">
             <mc:AlternateContent xmlns:mc="http://schemas.openxmlformats.org/markup-compatibility/2006">
               <mc:Choice xmlns:v="urn:schemas-microsoft-com:vml" Requires="v">
-                <p:oleObj spid="_x0000_s89132" name="Document" r:id="rId3" imgW="7313400" imgH="1158863" progId="Word.Document.12">
+                <p:oleObj spid="_x0000_s89134" name="Document" r:id="rId3" imgW="7313400" imgH="1158863" progId="Word.Document.12">
                   <p:embed/>
                 </p:oleObj>
               </mc:Choice>
@@ -9818,7 +9818,7 @@
           <a:graphicData uri="http://schemas.openxmlformats.org/presentationml/2006/ole">
             <mc:AlternateContent xmlns:mc="http://schemas.openxmlformats.org/markup-compatibility/2006">
               <mc:Choice xmlns:v="urn:schemas-microsoft-com:vml" Requires="v">
-                <p:oleObj spid="_x0000_s90154" name="Document" r:id="rId3" imgW="7313400" imgH="1610391" progId="Word.Document.12">
+                <p:oleObj spid="_x0000_s90156" name="Document" r:id="rId3" imgW="7313400" imgH="1610391" progId="Word.Document.12">
                   <p:embed/>
                 </p:oleObj>
               </mc:Choice>
@@ -9934,7 +9934,7 @@
           <a:graphicData uri="http://schemas.openxmlformats.org/presentationml/2006/ole">
             <mc:AlternateContent xmlns:mc="http://schemas.openxmlformats.org/markup-compatibility/2006">
               <mc:Choice xmlns:v="urn:schemas-microsoft-com:vml" Requires="v">
-                <p:oleObj spid="_x0000_s109590" name="Document" r:id="rId3" imgW="7301323" imgH="1848218" progId="Word.Document.12">
+                <p:oleObj spid="_x0000_s109592" name="Document" r:id="rId3" imgW="7301323" imgH="1848218" progId="Word.Document.12">
                   <p:embed/>
                 </p:oleObj>
               </mc:Choice>
@@ -10299,7 +10299,7 @@
           <a:graphicData uri="http://schemas.openxmlformats.org/presentationml/2006/ole">
             <mc:AlternateContent xmlns:mc="http://schemas.openxmlformats.org/markup-compatibility/2006">
               <mc:Choice xmlns:v="urn:schemas-microsoft-com:vml" Requires="v">
-                <p:oleObj spid="_x0000_s91179" name="Document" r:id="rId3" imgW="7313400" imgH="4140749" progId="Word.Document.12">
+                <p:oleObj spid="_x0000_s91181" name="Document" r:id="rId3" imgW="7313400" imgH="4140749" progId="Word.Document.12">
                   <p:embed/>
                 </p:oleObj>
               </mc:Choice>
@@ -10897,7 +10897,7 @@
           <a:graphicData uri="http://schemas.openxmlformats.org/presentationml/2006/ole">
             <mc:AlternateContent xmlns:mc="http://schemas.openxmlformats.org/markup-compatibility/2006">
               <mc:Choice xmlns:v="urn:schemas-microsoft-com:vml" Requires="v">
-                <p:oleObj spid="_x0000_s94251" name="Document" r:id="rId3" imgW="7313400" imgH="4862834" progId="Word.Document.12">
+                <p:oleObj spid="_x0000_s94253" name="Document" r:id="rId3" imgW="7313400" imgH="4862834" progId="Word.Document.12">
                   <p:embed/>
                 </p:oleObj>
               </mc:Choice>
@@ -11111,7 +11111,7 @@
           <a:graphicData uri="http://schemas.openxmlformats.org/presentationml/2006/ole">
             <mc:AlternateContent xmlns:mc="http://schemas.openxmlformats.org/markup-compatibility/2006">
               <mc:Choice xmlns:v="urn:schemas-microsoft-com:vml" Requires="v">
-                <p:oleObj spid="_x0000_s123927" name="Document" r:id="rId4" imgW="7313400" imgH="4058358" progId="Word.Document.12">
+                <p:oleObj spid="_x0000_s123929" name="Document" r:id="rId4" imgW="7313400" imgH="4058358" progId="Word.Document.12">
                   <p:embed/>
                 </p:oleObj>
               </mc:Choice>
@@ -11510,7 +11510,7 @@
           <a:graphicData uri="http://schemas.openxmlformats.org/presentationml/2006/ole">
             <mc:AlternateContent xmlns:mc="http://schemas.openxmlformats.org/markup-compatibility/2006">
               <mc:Choice xmlns:v="urn:schemas-microsoft-com:vml" Requires="v">
-                <p:oleObj spid="_x0000_s124952" name="Document" r:id="rId3" imgW="7301323" imgH="3913917" progId="Word.Document.12">
+                <p:oleObj spid="_x0000_s124954" name="Document" r:id="rId3" imgW="7301323" imgH="3913917" progId="Word.Document.12">
                   <p:embed/>
                 </p:oleObj>
               </mc:Choice>
@@ -11724,7 +11724,7 @@
           <a:graphicData uri="http://schemas.openxmlformats.org/presentationml/2006/ole">
             <mc:AlternateContent xmlns:mc="http://schemas.openxmlformats.org/markup-compatibility/2006">
               <mc:Choice xmlns:v="urn:schemas-microsoft-com:vml" Requires="v">
-                <p:oleObj spid="_x0000_s125975" name="Document" r:id="rId3" imgW="7313400" imgH="3680945" progId="Word.Document.12">
+                <p:oleObj spid="_x0000_s125977" name="Document" r:id="rId3" imgW="7313400" imgH="3680945" progId="Word.Document.12">
                   <p:embed/>
                 </p:oleObj>
               </mc:Choice>
@@ -11938,7 +11938,7 @@
           <a:graphicData uri="http://schemas.openxmlformats.org/presentationml/2006/ole">
             <mc:AlternateContent xmlns:mc="http://schemas.openxmlformats.org/markup-compatibility/2006">
               <mc:Choice xmlns:v="urn:schemas-microsoft-com:vml" Requires="v">
-                <p:oleObj spid="_x0000_s96299" name="Document" r:id="rId3" imgW="7313400" imgH="4259837" progId="Word.Document.12">
+                <p:oleObj spid="_x0000_s96301" name="Document" r:id="rId3" imgW="7313400" imgH="4259837" progId="Word.Document.12">
                   <p:embed/>
                 </p:oleObj>
               </mc:Choice>
@@ -12152,7 +12152,7 @@
           <a:graphicData uri="http://schemas.openxmlformats.org/presentationml/2006/ole">
             <mc:AlternateContent xmlns:mc="http://schemas.openxmlformats.org/markup-compatibility/2006">
               <mc:Choice xmlns:v="urn:schemas-microsoft-com:vml" Requires="v">
-                <p:oleObj spid="_x0000_s127000" name="Document" r:id="rId3" imgW="7313400" imgH="4662795" progId="Word.Document.12">
+                <p:oleObj spid="_x0000_s127002" name="Document" r:id="rId3" imgW="7313400" imgH="4662795" progId="Word.Document.12">
                   <p:embed/>
                 </p:oleObj>
               </mc:Choice>
@@ -12268,7 +12268,7 @@
           <a:graphicData uri="http://schemas.openxmlformats.org/presentationml/2006/ole">
             <mc:AlternateContent xmlns:mc="http://schemas.openxmlformats.org/markup-compatibility/2006">
               <mc:Choice xmlns:v="urn:schemas-microsoft-com:vml" Requires="v">
-                <p:oleObj spid="_x0000_s110613" name="Document" r:id="rId3" imgW="7301323" imgH="1848218" progId="Word.Document.12">
+                <p:oleObj spid="_x0000_s110615" name="Document" r:id="rId3" imgW="7301323" imgH="1848218" progId="Word.Document.12">
                   <p:embed/>
                 </p:oleObj>
               </mc:Choice>
@@ -12613,7 +12613,7 @@
           <a:graphicData uri="http://schemas.openxmlformats.org/presentationml/2006/ole">
             <mc:AlternateContent xmlns:mc="http://schemas.openxmlformats.org/markup-compatibility/2006">
               <mc:Choice xmlns:v="urn:schemas-microsoft-com:vml" Requires="v">
-                <p:oleObj spid="_x0000_s98343" name="Document" r:id="rId3" imgW="7313400" imgH="4684741" progId="Word.Document.12">
+                <p:oleObj spid="_x0000_s98345" name="Document" r:id="rId3" imgW="7313400" imgH="4684741" progId="Word.Document.12">
                   <p:embed/>
                 </p:oleObj>
               </mc:Choice>
@@ -13389,7 +13389,7 @@
           <a:graphicData uri="http://schemas.openxmlformats.org/presentationml/2006/ole">
             <mc:AlternateContent xmlns:mc="http://schemas.openxmlformats.org/markup-compatibility/2006">
               <mc:Choice xmlns:v="urn:schemas-microsoft-com:vml" Requires="v">
-                <p:oleObj spid="_x0000_s105507" name="Document" r:id="rId3" imgW="7313400" imgH="4949902" progId="Word.Document.12">
+                <p:oleObj spid="_x0000_s105509" name="Document" r:id="rId3" imgW="7313400" imgH="4949902" progId="Word.Document.12">
                   <p:embed/>
                 </p:oleObj>
               </mc:Choice>
@@ -13603,7 +13603,7 @@
           <a:graphicData uri="http://schemas.openxmlformats.org/presentationml/2006/ole">
             <mc:AlternateContent xmlns:mc="http://schemas.openxmlformats.org/markup-compatibility/2006">
               <mc:Choice xmlns:v="urn:schemas-microsoft-com:vml" Requires="v">
-                <p:oleObj spid="_x0000_s108577" name="Document" r:id="rId3" imgW="7301323" imgH="4750350" progId="Word.Document.12">
+                <p:oleObj spid="_x0000_s108579" name="Document" r:id="rId3" imgW="7301323" imgH="4750350" progId="Word.Document.12">
                   <p:embed/>
                 </p:oleObj>
               </mc:Choice>
@@ -13817,7 +13817,7 @@
           <a:graphicData uri="http://schemas.openxmlformats.org/presentationml/2006/ole">
             <mc:AlternateContent xmlns:mc="http://schemas.openxmlformats.org/markup-compatibility/2006">
               <mc:Choice xmlns:v="urn:schemas-microsoft-com:vml" Requires="v">
-                <p:oleObj spid="_x0000_s111637" name="Document" r:id="rId3" imgW="7313400" imgH="1302416" progId="Word.Document.12">
+                <p:oleObj spid="_x0000_s111639" name="Document" r:id="rId3" imgW="7313400" imgH="1302416" progId="Word.Document.12">
                   <p:embed/>
                 </p:oleObj>
               </mc:Choice>
@@ -13926,7 +13926,7 @@
           <a:graphicData uri="http://schemas.openxmlformats.org/presentationml/2006/ole">
             <mc:AlternateContent xmlns:mc="http://schemas.openxmlformats.org/markup-compatibility/2006">
               <mc:Choice xmlns:v="urn:schemas-microsoft-com:vml" Requires="v">
-                <p:oleObj spid="_x0000_s112661" name="Document" r:id="rId3" imgW="7301323" imgH="2000526" progId="Word.Document.12">
+                <p:oleObj spid="_x0000_s112663" name="Document" r:id="rId3" imgW="7301323" imgH="2000526" progId="Word.Document.12">
                   <p:embed/>
                 </p:oleObj>
               </mc:Choice>
@@ -14166,7 +14166,7 @@
           <a:graphicData uri="http://schemas.openxmlformats.org/presentationml/2006/ole">
             <mc:AlternateContent xmlns:mc="http://schemas.openxmlformats.org/markup-compatibility/2006">
               <mc:Choice xmlns:v="urn:schemas-microsoft-com:vml" Requires="v">
-                <p:oleObj spid="_x0000_s113685" name="Document" r:id="rId3" imgW="7301323" imgH="2000526" progId="Word.Document.12">
+                <p:oleObj spid="_x0000_s113687" name="Document" r:id="rId3" imgW="7301323" imgH="2000526" progId="Word.Document.12">
                   <p:embed/>
                 </p:oleObj>
               </mc:Choice>
@@ -14406,7 +14406,7 @@
           <a:graphicData uri="http://schemas.openxmlformats.org/presentationml/2006/ole">
             <mc:AlternateContent xmlns:mc="http://schemas.openxmlformats.org/markup-compatibility/2006">
               <mc:Choice xmlns:v="urn:schemas-microsoft-com:vml" Requires="v">
-                <p:oleObj spid="_x0000_s114710" name="Document" r:id="rId3" imgW="7301323" imgH="2000526" progId="Word.Document.12">
+                <p:oleObj spid="_x0000_s114712" name="Document" r:id="rId3" imgW="7301323" imgH="2000526" progId="Word.Document.12">
                   <p:embed/>
                 </p:oleObj>
               </mc:Choice>

</xml_diff>